<commit_message>
- Bugfix: Distance Correction caused crash if no Pwheel input was defined - Release Notes updated - User Manual updated - Generic Vehicles updated
</commit_message>
<xml_diff>
--- a/User Manual Source/Release Notes V2.1.pptx
+++ b/User Manual Source/Release Notes V2.1.pptx
@@ -4846,8 +4846,13 @@
                   <a:srgbClr val="990000"/>
                 </a:solidFill>
               </a:rPr>
-              <a:t>20.04.2015</a:t>
-            </a:r>
+              <a:t>21.04.2015</a:t>
+            </a:r>
+            <a:endParaRPr lang="en-US" sz="2000" dirty="0" smtClean="0">
+              <a:solidFill>
+                <a:srgbClr val="990000"/>
+              </a:solidFill>
+            </a:endParaRPr>
           </a:p>
           <a:p>
             <a:pPr eaLnBrk="1" hangingPunct="1"/>
@@ -5423,11 +5428,7 @@
             </a:pPr>
             <a:r>
               <a:rPr lang="en-GB" sz="1400" b="0" dirty="0" smtClean="0"/>
-              <a:t>Overwrites power </a:t>
-            </a:r>
-            <a:r>
-              <a:rPr lang="en-GB" sz="1400" b="0" dirty="0" smtClean="0"/>
-              <a:t>calculation</a:t>
+              <a:t>Overwrites power calculation</a:t>
             </a:r>
           </a:p>
           <a:p>
@@ -5445,7 +5446,6 @@
               <a:rPr lang="en-GB" sz="1400" b="0" dirty="0" smtClean="0"/>
               <a:t>VECTO only calculates power train losses, engine torque/rpm and fuel consumption</a:t>
             </a:r>
-            <a:endParaRPr lang="en-GB" sz="1400" b="0" dirty="0" smtClean="0"/>
           </a:p>
         </p:txBody>
       </p:sp>
@@ -7103,7 +7103,7 @@
             </a:pPr>
             <a:r>
               <a:rPr lang="en-GB" sz="1400" b="0" dirty="0" smtClean="0"/>
-              <a:t>Only distance-based cycles are supported</a:t>
+              <a:t>Only time-based cycles are supported</a:t>
             </a:r>
           </a:p>
           <a:p>
@@ -7408,7 +7408,7 @@
         </p:nvSpPr>
         <p:spPr>
           <a:xfrm>
-            <a:off x="2626714" y="3502457"/>
+            <a:off x="2555776" y="3522494"/>
             <a:ext cx="2165978" cy="338554"/>
           </a:xfrm>
           <a:prstGeom prst="rect">

</xml_diff>

<commit_message>
- Fixed issue at low speeds
</commit_message>
<xml_diff>
--- a/User Manual Source/Release Notes V2.1.pptx
+++ b/User Manual Source/Release Notes V2.1.pptx
@@ -5,10 +5,10 @@
     <p:sldMasterId id="2147483648" r:id="rId1"/>
   </p:sldMasterIdLst>
   <p:notesMasterIdLst>
-    <p:notesMasterId r:id="rId9"/>
+    <p:notesMasterId r:id="rId10"/>
   </p:notesMasterIdLst>
   <p:handoutMasterIdLst>
-    <p:handoutMasterId r:id="rId10"/>
+    <p:handoutMasterId r:id="rId11"/>
   </p:handoutMasterIdLst>
   <p:sldIdLst>
     <p:sldId id="575" r:id="rId2"/>
@@ -17,7 +17,8 @@
     <p:sldId id="635" r:id="rId5"/>
     <p:sldId id="636" r:id="rId6"/>
     <p:sldId id="629" r:id="rId7"/>
-    <p:sldId id="634" r:id="rId8"/>
+    <p:sldId id="637" r:id="rId8"/>
+    <p:sldId id="634" r:id="rId9"/>
   </p:sldIdLst>
   <p:sldSz cx="9144000" cy="6858000" type="screen4x3"/>
   <p:notesSz cx="6805613" cy="9944100"/>
@@ -1435,6 +1436,101 @@
                 <a:defRPr/>
               </a:pPr>
               <a:t>6</a:t>
+            </a:fld>
+            <a:endParaRPr lang="de-AT"/>
+          </a:p>
+        </p:txBody>
+      </p:sp>
+    </p:spTree>
+    <p:extLst>
+      <p:ext uri="{BB962C8B-B14F-4D97-AF65-F5344CB8AC3E}">
+        <p14:creationId xmlns:p14="http://schemas.microsoft.com/office/powerpoint/2010/main" val="850973114"/>
+      </p:ext>
+    </p:extLst>
+  </p:cSld>
+  <p:clrMapOvr>
+    <a:masterClrMapping/>
+  </p:clrMapOvr>
+</p:notes>
+</file>
+
+<file path=ppt/notesSlides/notesSlide5.xml><?xml version="1.0" encoding="utf-8"?>
+<p:notes xmlns:a="http://schemas.openxmlformats.org/drawingml/2006/main" xmlns:r="http://schemas.openxmlformats.org/officeDocument/2006/relationships" xmlns:p="http://schemas.openxmlformats.org/presentationml/2006/main">
+  <p:cSld>
+    <p:spTree>
+      <p:nvGrpSpPr>
+        <p:cNvPr id="1" name=""/>
+        <p:cNvGrpSpPr/>
+        <p:nvPr/>
+      </p:nvGrpSpPr>
+      <p:grpSpPr>
+        <a:xfrm>
+          <a:off x="0" y="0"/>
+          <a:ext cx="0" cy="0"/>
+          <a:chOff x="0" y="0"/>
+          <a:chExt cx="0" cy="0"/>
+        </a:xfrm>
+      </p:grpSpPr>
+      <p:sp>
+        <p:nvSpPr>
+          <p:cNvPr id="2" name="Folienbildplatzhalter 1"/>
+          <p:cNvSpPr>
+            <a:spLocks noGrp="1" noRot="1" noChangeAspect="1"/>
+          </p:cNvSpPr>
+          <p:nvPr>
+            <p:ph type="sldImg"/>
+          </p:nvPr>
+        </p:nvSpPr>
+        <p:spPr>
+          <a:xfrm>
+            <a:off x="915988" y="746125"/>
+            <a:ext cx="4973637" cy="3729038"/>
+          </a:xfrm>
+        </p:spPr>
+      </p:sp>
+      <p:sp>
+        <p:nvSpPr>
+          <p:cNvPr id="3" name="Notizenplatzhalter 2"/>
+          <p:cNvSpPr>
+            <a:spLocks noGrp="1"/>
+          </p:cNvSpPr>
+          <p:nvPr>
+            <p:ph type="body" idx="1"/>
+          </p:nvPr>
+        </p:nvSpPr>
+        <p:spPr/>
+        <p:txBody>
+          <a:bodyPr/>
+          <a:lstStyle/>
+          <a:p>
+            <a:endParaRPr lang="en-GB" dirty="0"/>
+          </a:p>
+        </p:txBody>
+      </p:sp>
+      <p:sp>
+        <p:nvSpPr>
+          <p:cNvPr id="4" name="Foliennummernplatzhalter 3"/>
+          <p:cNvSpPr>
+            <a:spLocks noGrp="1"/>
+          </p:cNvSpPr>
+          <p:nvPr>
+            <p:ph type="sldNum" sz="quarter" idx="10"/>
+          </p:nvPr>
+        </p:nvSpPr>
+        <p:spPr/>
+        <p:txBody>
+          <a:bodyPr/>
+          <a:lstStyle/>
+          <a:p>
+            <a:pPr>
+              <a:defRPr/>
+            </a:pPr>
+            <a:fld id="{8335CF79-0E4B-49EE-B3D5-651E591A0B85}" type="slidenum">
+              <a:rPr lang="de-AT" smtClean="0"/>
+              <a:pPr>
+                <a:defRPr/>
+              </a:pPr>
+              <a:t>7</a:t>
             </a:fld>
             <a:endParaRPr lang="de-AT"/>
           </a:p>
@@ -4848,11 +4944,6 @@
               </a:rPr>
               <a:t>21.04.2015</a:t>
             </a:r>
-            <a:endParaRPr lang="en-US" sz="2000" dirty="0" smtClean="0">
-              <a:solidFill>
-                <a:srgbClr val="990000"/>
-              </a:solidFill>
-            </a:endParaRPr>
           </a:p>
           <a:p>
             <a:pPr eaLnBrk="1" hangingPunct="1"/>
@@ -7458,6 +7549,807 @@
 </file>
 
 <file path=ppt/slides/slide7.xml><?xml version="1.0" encoding="utf-8"?>
+<p:sld xmlns:a="http://schemas.openxmlformats.org/drawingml/2006/main" xmlns:r="http://schemas.openxmlformats.org/officeDocument/2006/relationships" xmlns:p="http://schemas.openxmlformats.org/presentationml/2006/main">
+  <p:cSld>
+    <p:spTree>
+      <p:nvGrpSpPr>
+        <p:cNvPr id="1" name=""/>
+        <p:cNvGrpSpPr/>
+        <p:nvPr/>
+      </p:nvGrpSpPr>
+      <p:grpSpPr>
+        <a:xfrm>
+          <a:off x="0" y="0"/>
+          <a:ext cx="0" cy="0"/>
+          <a:chOff x="0" y="0"/>
+          <a:chExt cx="0" cy="0"/>
+        </a:xfrm>
+      </p:grpSpPr>
+      <p:sp>
+        <p:nvSpPr>
+          <p:cNvPr id="25" name="Textfeld 24"/>
+          <p:cNvSpPr txBox="1"/>
+          <p:nvPr/>
+        </p:nvSpPr>
+        <p:spPr>
+          <a:xfrm>
+            <a:off x="251522" y="1340768"/>
+            <a:ext cx="8496944" cy="1661993"/>
+          </a:xfrm>
+          <a:prstGeom prst="rect">
+            <a:avLst/>
+          </a:prstGeom>
+          <a:noFill/>
+          <a:ln>
+            <a:noFill/>
+          </a:ln>
+        </p:spPr>
+        <p:txBody>
+          <a:bodyPr wrap="square" rtlCol="0">
+            <a:spAutoFit/>
+          </a:bodyPr>
+          <a:lstStyle/>
+          <a:p>
+            <a:pPr marL="342900" indent="-342900" algn="l">
+              <a:lnSpc>
+                <a:spcPct val="150000"/>
+              </a:lnSpc>
+              <a:spcBef>
+                <a:spcPts val="600"/>
+              </a:spcBef>
+              <a:buFont typeface="Arial" pitchFamily="34" charset="0"/>
+              <a:buChar char="•"/>
+            </a:pPr>
+            <a:r>
+              <a:rPr lang="en-GB" dirty="0" smtClean="0"/>
+              <a:t>Constant </a:t>
+            </a:r>
+            <a:r>
+              <a:rPr lang="en-GB" dirty="0" smtClean="0"/>
+              <a:t>point calculation</a:t>
+            </a:r>
+            <a:endParaRPr lang="en-GB" dirty="0" smtClean="0"/>
+          </a:p>
+          <a:p>
+            <a:pPr marL="800100" lvl="1" indent="-342900" algn="l">
+              <a:lnSpc>
+                <a:spcPct val="150000"/>
+              </a:lnSpc>
+              <a:spcBef>
+                <a:spcPts val="600"/>
+              </a:spcBef>
+              <a:buFont typeface="Arial" pitchFamily="34" charset="0"/>
+              <a:buChar char="•"/>
+            </a:pPr>
+            <a:r>
+              <a:rPr lang="en-GB" sz="1400" b="0" dirty="0" smtClean="0"/>
+              <a:t>Define (at least) two identical times steps</a:t>
+            </a:r>
+          </a:p>
+          <a:p>
+            <a:pPr marL="800100" lvl="1" indent="-342900" algn="l">
+              <a:lnSpc>
+                <a:spcPct val="150000"/>
+              </a:lnSpc>
+              <a:spcBef>
+                <a:spcPts val="600"/>
+              </a:spcBef>
+              <a:buFont typeface="Arial" pitchFamily="34" charset="0"/>
+              <a:buChar char="•"/>
+            </a:pPr>
+            <a:r>
+              <a:rPr lang="en-GB" sz="1400" b="0" dirty="0" smtClean="0"/>
+              <a:t>(Optional) Add additional auxiliary power consumption with </a:t>
+            </a:r>
+            <a:r>
+              <a:rPr lang="en-GB" sz="1400" dirty="0" smtClean="0"/>
+              <a:t>&lt;</a:t>
+            </a:r>
+            <a:r>
+              <a:rPr lang="en-GB" sz="1400" dirty="0" err="1" smtClean="0"/>
+              <a:t>Padd</a:t>
+            </a:r>
+            <a:r>
+              <a:rPr lang="en-GB" sz="1400" dirty="0" smtClean="0"/>
+              <a:t>&gt;</a:t>
+            </a:r>
+          </a:p>
+          <a:p>
+            <a:pPr marL="800100" lvl="1" indent="-342900" algn="l">
+              <a:lnSpc>
+                <a:spcPct val="150000"/>
+              </a:lnSpc>
+              <a:spcBef>
+                <a:spcPts val="600"/>
+              </a:spcBef>
+              <a:buFont typeface="Arial" pitchFamily="34" charset="0"/>
+              <a:buChar char="•"/>
+            </a:pPr>
+            <a:r>
+              <a:rPr lang="en-GB" sz="1400" b="0" dirty="0" smtClean="0"/>
+              <a:t>It is suggested to define </a:t>
+            </a:r>
+            <a:r>
+              <a:rPr lang="en-GB" sz="1400" dirty="0" smtClean="0"/>
+              <a:t>one cycle per constant </a:t>
+            </a:r>
+            <a:r>
+              <a:rPr lang="en-GB" sz="1400" dirty="0" smtClean="0"/>
+              <a:t>point</a:t>
+            </a:r>
+            <a:r>
+              <a:rPr lang="en-GB" sz="1400" b="0" dirty="0" smtClean="0"/>
+              <a:t> </a:t>
+            </a:r>
+            <a:r>
+              <a:rPr lang="en-GB" sz="1400" b="0" dirty="0" smtClean="0"/>
+              <a:t>and use </a:t>
+            </a:r>
+            <a:r>
+              <a:rPr lang="en-GB" sz="1400" dirty="0" smtClean="0"/>
+              <a:t>Batch Mode</a:t>
+            </a:r>
+            <a:r>
+              <a:rPr lang="en-GB" sz="1400" b="0" u="sng" dirty="0" smtClean="0"/>
+              <a:t> </a:t>
+            </a:r>
+          </a:p>
+        </p:txBody>
+      </p:sp>
+      <p:sp>
+        <p:nvSpPr>
+          <p:cNvPr id="20" name="Rectangle 3"/>
+          <p:cNvSpPr txBox="1">
+            <a:spLocks noChangeArrowheads="1"/>
+          </p:cNvSpPr>
+          <p:nvPr/>
+        </p:nvSpPr>
+        <p:spPr bwMode="auto">
+          <a:xfrm>
+            <a:off x="0" y="778669"/>
+            <a:ext cx="9144000" cy="346075"/>
+          </a:xfrm>
+          <a:prstGeom prst="rect">
+            <a:avLst/>
+          </a:prstGeom>
+          <a:noFill/>
+          <a:ln>
+            <a:noFill/>
+          </a:ln>
+          <a:effectLst/>
+          <a:extLst>
+            <a:ext uri="{909E8E84-426E-40DD-AFC4-6F175D3DCCD1}">
+              <a14:hiddenFill xmlns:a14="http://schemas.microsoft.com/office/drawing/2010/main">
+                <a:solidFill>
+                  <a:srgbClr val="DDDDDD"/>
+                </a:solidFill>
+              </a14:hiddenFill>
+            </a:ext>
+            <a:ext uri="{91240B29-F687-4F45-9708-019B960494DF}">
+              <a14:hiddenLine xmlns:a14="http://schemas.microsoft.com/office/drawing/2010/main" w="9525">
+                <a:solidFill>
+                  <a:schemeClr val="tx1"/>
+                </a:solidFill>
+                <a:miter lim="800000"/>
+                <a:headEnd/>
+                <a:tailEnd/>
+              </a14:hiddenLine>
+            </a:ext>
+            <a:ext uri="{AF507438-7753-43E0-B8FC-AC1667EBCBE1}">
+              <a14:hiddenEffects xmlns:a14="http://schemas.microsoft.com/office/drawing/2010/main">
+                <a:effectLst>
+                  <a:outerShdw dist="35921" dir="2700000" algn="ctr" rotWithShape="0">
+                    <a:schemeClr val="bg2"/>
+                  </a:outerShdw>
+                </a:effectLst>
+              </a14:hiddenEffects>
+            </a:ext>
+          </a:extLst>
+        </p:spPr>
+        <p:txBody>
+          <a:bodyPr vert="horz" wrap="square" lIns="91440" tIns="45720" rIns="91440" bIns="45720" numCol="1" anchor="ctr" anchorCtr="0" compatLnSpc="1">
+            <a:prstTxWarp prst="textNoShape">
+              <a:avLst/>
+            </a:prstTxWarp>
+          </a:bodyPr>
+          <a:lstStyle>
+            <a:lvl1pPr algn="ctr" rtl="0" eaLnBrk="0" fontAlgn="base" hangingPunct="0">
+              <a:spcBef>
+                <a:spcPct val="0"/>
+              </a:spcBef>
+              <a:spcAft>
+                <a:spcPct val="0"/>
+              </a:spcAft>
+              <a:defRPr sz="2400" b="1">
+                <a:solidFill>
+                  <a:srgbClr val="990000"/>
+                </a:solidFill>
+                <a:latin typeface="+mj-lt"/>
+                <a:ea typeface="+mj-ea"/>
+                <a:cs typeface="+mj-cs"/>
+              </a:defRPr>
+            </a:lvl1pPr>
+            <a:lvl2pPr algn="ctr" rtl="0" eaLnBrk="0" fontAlgn="base" hangingPunct="0">
+              <a:spcBef>
+                <a:spcPct val="0"/>
+              </a:spcBef>
+              <a:spcAft>
+                <a:spcPct val="0"/>
+              </a:spcAft>
+              <a:defRPr sz="2400" b="1">
+                <a:solidFill>
+                  <a:srgbClr val="990000"/>
+                </a:solidFill>
+                <a:latin typeface="Arial" pitchFamily="34" charset="0"/>
+              </a:defRPr>
+            </a:lvl2pPr>
+            <a:lvl3pPr algn="ctr" rtl="0" eaLnBrk="0" fontAlgn="base" hangingPunct="0">
+              <a:spcBef>
+                <a:spcPct val="0"/>
+              </a:spcBef>
+              <a:spcAft>
+                <a:spcPct val="0"/>
+              </a:spcAft>
+              <a:defRPr sz="2400" b="1">
+                <a:solidFill>
+                  <a:srgbClr val="990000"/>
+                </a:solidFill>
+                <a:latin typeface="Arial" pitchFamily="34" charset="0"/>
+              </a:defRPr>
+            </a:lvl3pPr>
+            <a:lvl4pPr algn="ctr" rtl="0" eaLnBrk="0" fontAlgn="base" hangingPunct="0">
+              <a:spcBef>
+                <a:spcPct val="0"/>
+              </a:spcBef>
+              <a:spcAft>
+                <a:spcPct val="0"/>
+              </a:spcAft>
+              <a:defRPr sz="2400" b="1">
+                <a:solidFill>
+                  <a:srgbClr val="990000"/>
+                </a:solidFill>
+                <a:latin typeface="Arial" pitchFamily="34" charset="0"/>
+              </a:defRPr>
+            </a:lvl4pPr>
+            <a:lvl5pPr algn="ctr" rtl="0" eaLnBrk="0" fontAlgn="base" hangingPunct="0">
+              <a:spcBef>
+                <a:spcPct val="0"/>
+              </a:spcBef>
+              <a:spcAft>
+                <a:spcPct val="0"/>
+              </a:spcAft>
+              <a:defRPr sz="2400" b="1">
+                <a:solidFill>
+                  <a:srgbClr val="990000"/>
+                </a:solidFill>
+                <a:latin typeface="Arial" pitchFamily="34" charset="0"/>
+              </a:defRPr>
+            </a:lvl5pPr>
+            <a:lvl6pPr marL="457200" algn="ctr" rtl="0" fontAlgn="base">
+              <a:spcBef>
+                <a:spcPct val="0"/>
+              </a:spcBef>
+              <a:spcAft>
+                <a:spcPct val="0"/>
+              </a:spcAft>
+              <a:defRPr sz="2400" b="1">
+                <a:solidFill>
+                  <a:srgbClr val="990000"/>
+                </a:solidFill>
+                <a:latin typeface="Arial" pitchFamily="34" charset="0"/>
+              </a:defRPr>
+            </a:lvl6pPr>
+            <a:lvl7pPr marL="914400" algn="ctr" rtl="0" fontAlgn="base">
+              <a:spcBef>
+                <a:spcPct val="0"/>
+              </a:spcBef>
+              <a:spcAft>
+                <a:spcPct val="0"/>
+              </a:spcAft>
+              <a:defRPr sz="2400" b="1">
+                <a:solidFill>
+                  <a:srgbClr val="990000"/>
+                </a:solidFill>
+                <a:latin typeface="Arial" pitchFamily="34" charset="0"/>
+              </a:defRPr>
+            </a:lvl7pPr>
+            <a:lvl8pPr marL="1371600" algn="ctr" rtl="0" fontAlgn="base">
+              <a:spcBef>
+                <a:spcPct val="0"/>
+              </a:spcBef>
+              <a:spcAft>
+                <a:spcPct val="0"/>
+              </a:spcAft>
+              <a:defRPr sz="2400" b="1">
+                <a:solidFill>
+                  <a:srgbClr val="990000"/>
+                </a:solidFill>
+                <a:latin typeface="Arial" pitchFamily="34" charset="0"/>
+              </a:defRPr>
+            </a:lvl8pPr>
+            <a:lvl9pPr marL="1828800" algn="ctr" rtl="0" fontAlgn="base">
+              <a:spcBef>
+                <a:spcPct val="0"/>
+              </a:spcBef>
+              <a:spcAft>
+                <a:spcPct val="0"/>
+              </a:spcAft>
+              <a:defRPr sz="2400" b="1">
+                <a:solidFill>
+                  <a:srgbClr val="990000"/>
+                </a:solidFill>
+                <a:latin typeface="Arial" pitchFamily="34" charset="0"/>
+              </a:defRPr>
+            </a:lvl9pPr>
+          </a:lstStyle>
+          <a:p>
+            <a:pPr eaLnBrk="1" hangingPunct="1"/>
+            <a:r>
+              <a:rPr lang="en-GB" sz="2800" kern="0" dirty="0" err="1" smtClean="0"/>
+              <a:t>P</a:t>
+            </a:r>
+            <a:r>
+              <a:rPr lang="en-GB" sz="2800" kern="0" baseline="-25000" dirty="0" err="1" smtClean="0"/>
+              <a:t>wheel</a:t>
+            </a:r>
+            <a:r>
+              <a:rPr lang="en-GB" sz="2800" kern="0" dirty="0" smtClean="0"/>
+              <a:t> Input (</a:t>
+            </a:r>
+            <a:r>
+              <a:rPr lang="en-GB" sz="2800" kern="0" dirty="0" err="1" smtClean="0"/>
+              <a:t>SiCo</a:t>
+            </a:r>
+            <a:r>
+              <a:rPr lang="en-GB" sz="2800" kern="0" dirty="0" smtClean="0"/>
+              <a:t> Mode)</a:t>
+            </a:r>
+            <a:endParaRPr lang="en-GB" sz="2800" kern="0" dirty="0"/>
+          </a:p>
+        </p:txBody>
+      </p:sp>
+      <p:sp>
+        <p:nvSpPr>
+          <p:cNvPr id="4" name="Textfeld 3"/>
+          <p:cNvSpPr txBox="1"/>
+          <p:nvPr/>
+        </p:nvSpPr>
+        <p:spPr>
+          <a:xfrm>
+            <a:off x="325331" y="3594502"/>
+            <a:ext cx="5046574" cy="338554"/>
+          </a:xfrm>
+          <a:prstGeom prst="rect">
+            <a:avLst/>
+          </a:prstGeom>
+          <a:noFill/>
+          <a:ln>
+            <a:noFill/>
+          </a:ln>
+        </p:spPr>
+        <p:txBody>
+          <a:bodyPr wrap="none" rtlCol="0">
+            <a:spAutoFit/>
+          </a:bodyPr>
+          <a:lstStyle/>
+          <a:p>
+            <a:pPr algn="l">
+              <a:spcBef>
+                <a:spcPts val="0"/>
+              </a:spcBef>
+            </a:pPr>
+            <a:r>
+              <a:rPr lang="en-GB" dirty="0" smtClean="0"/>
+              <a:t>Example: Calculation of two constant </a:t>
+            </a:r>
+            <a:r>
+              <a:rPr lang="en-GB" dirty="0" smtClean="0"/>
+              <a:t>points tests</a:t>
+            </a:r>
+            <a:endParaRPr lang="en-GB" dirty="0" smtClean="0"/>
+          </a:p>
+        </p:txBody>
+      </p:sp>
+      <p:pic>
+        <p:nvPicPr>
+          <p:cNvPr id="1026" name="Picture 2"/>
+          <p:cNvPicPr>
+            <a:picLocks noChangeAspect="1" noChangeArrowheads="1"/>
+          </p:cNvPicPr>
+          <p:nvPr/>
+        </p:nvPicPr>
+        <p:blipFill>
+          <a:blip r:embed="rId3">
+            <a:extLst>
+              <a:ext uri="{28A0092B-C50C-407E-A947-70E740481C1C}">
+                <a14:useLocalDpi xmlns:a14="http://schemas.microsoft.com/office/drawing/2010/main" val="0"/>
+              </a:ext>
+            </a:extLst>
+          </a:blip>
+          <a:srcRect/>
+          <a:stretch>
+            <a:fillRect/>
+          </a:stretch>
+        </p:blipFill>
+        <p:spPr bwMode="auto">
+          <a:xfrm>
+            <a:off x="539552" y="4350618"/>
+            <a:ext cx="3152775" cy="590550"/>
+          </a:xfrm>
+          <a:prstGeom prst="rect">
+            <a:avLst/>
+          </a:prstGeom>
+          <a:noFill/>
+          <a:ln>
+            <a:noFill/>
+          </a:ln>
+          <a:effectLst/>
+          <a:extLst>
+            <a:ext uri="{909E8E84-426E-40DD-AFC4-6F175D3DCCD1}">
+              <a14:hiddenFill xmlns:a14="http://schemas.microsoft.com/office/drawing/2010/main">
+                <a:solidFill>
+                  <a:schemeClr val="accent1"/>
+                </a:solidFill>
+              </a14:hiddenFill>
+            </a:ext>
+            <a:ext uri="{91240B29-F687-4F45-9708-019B960494DF}">
+              <a14:hiddenLine xmlns:a14="http://schemas.microsoft.com/office/drawing/2010/main" w="9525">
+                <a:solidFill>
+                  <a:schemeClr val="tx1"/>
+                </a:solidFill>
+                <a:miter lim="800000"/>
+                <a:headEnd/>
+                <a:tailEnd/>
+              </a14:hiddenLine>
+            </a:ext>
+            <a:ext uri="{AF507438-7753-43E0-B8FC-AC1667EBCBE1}">
+              <a14:hiddenEffects xmlns:a14="http://schemas.microsoft.com/office/drawing/2010/main">
+                <a:effectLst>
+                  <a:outerShdw dist="35921" dir="2700000" algn="ctr" rotWithShape="0">
+                    <a:schemeClr val="bg2"/>
+                  </a:outerShdw>
+                </a:effectLst>
+              </a14:hiddenEffects>
+            </a:ext>
+          </a:extLst>
+        </p:spPr>
+      </p:pic>
+      <p:pic>
+        <p:nvPicPr>
+          <p:cNvPr id="1027" name="Picture 3"/>
+          <p:cNvPicPr>
+            <a:picLocks noChangeAspect="1" noChangeArrowheads="1"/>
+          </p:cNvPicPr>
+          <p:nvPr/>
+        </p:nvPicPr>
+        <p:blipFill>
+          <a:blip r:embed="rId4">
+            <a:extLst>
+              <a:ext uri="{28A0092B-C50C-407E-A947-70E740481C1C}">
+                <a14:useLocalDpi xmlns:a14="http://schemas.microsoft.com/office/drawing/2010/main" val="0"/>
+              </a:ext>
+            </a:extLst>
+          </a:blip>
+          <a:srcRect/>
+          <a:stretch>
+            <a:fillRect/>
+          </a:stretch>
+        </p:blipFill>
+        <p:spPr bwMode="auto">
+          <a:xfrm>
+            <a:off x="539552" y="5430738"/>
+            <a:ext cx="3152775" cy="590550"/>
+          </a:xfrm>
+          <a:prstGeom prst="rect">
+            <a:avLst/>
+          </a:prstGeom>
+          <a:noFill/>
+          <a:ln>
+            <a:noFill/>
+          </a:ln>
+          <a:effectLst/>
+          <a:extLst>
+            <a:ext uri="{909E8E84-426E-40DD-AFC4-6F175D3DCCD1}">
+              <a14:hiddenFill xmlns:a14="http://schemas.microsoft.com/office/drawing/2010/main">
+                <a:solidFill>
+                  <a:schemeClr val="accent1"/>
+                </a:solidFill>
+              </a14:hiddenFill>
+            </a:ext>
+            <a:ext uri="{91240B29-F687-4F45-9708-019B960494DF}">
+              <a14:hiddenLine xmlns:a14="http://schemas.microsoft.com/office/drawing/2010/main" w="9525">
+                <a:solidFill>
+                  <a:schemeClr val="tx1"/>
+                </a:solidFill>
+                <a:miter lim="800000"/>
+                <a:headEnd/>
+                <a:tailEnd/>
+              </a14:hiddenLine>
+            </a:ext>
+            <a:ext uri="{AF507438-7753-43E0-B8FC-AC1667EBCBE1}">
+              <a14:hiddenEffects xmlns:a14="http://schemas.microsoft.com/office/drawing/2010/main">
+                <a:effectLst>
+                  <a:outerShdw dist="35921" dir="2700000" algn="ctr" rotWithShape="0">
+                    <a:schemeClr val="bg2"/>
+                  </a:outerShdw>
+                </a:effectLst>
+              </a14:hiddenEffects>
+            </a:ext>
+          </a:extLst>
+        </p:spPr>
+      </p:pic>
+      <p:sp>
+        <p:nvSpPr>
+          <p:cNvPr id="9" name="Textfeld 8"/>
+          <p:cNvSpPr txBox="1"/>
+          <p:nvPr/>
+        </p:nvSpPr>
+        <p:spPr>
+          <a:xfrm>
+            <a:off x="467544" y="4063127"/>
+            <a:ext cx="1120820" cy="307777"/>
+          </a:xfrm>
+          <a:prstGeom prst="rect">
+            <a:avLst/>
+          </a:prstGeom>
+          <a:noFill/>
+          <a:ln>
+            <a:noFill/>
+          </a:ln>
+        </p:spPr>
+        <p:txBody>
+          <a:bodyPr wrap="none" rtlCol="0">
+            <a:spAutoFit/>
+          </a:bodyPr>
+          <a:lstStyle/>
+          <a:p>
+            <a:pPr algn="l">
+              <a:spcBef>
+                <a:spcPts val="0"/>
+              </a:spcBef>
+            </a:pPr>
+            <a:r>
+              <a:rPr lang="en-GB" sz="1400" b="0" dirty="0" smtClean="0"/>
+              <a:t>Cycle 1.vdri</a:t>
+            </a:r>
+          </a:p>
+        </p:txBody>
+      </p:sp>
+      <p:sp>
+        <p:nvSpPr>
+          <p:cNvPr id="12" name="Textfeld 11"/>
+          <p:cNvSpPr txBox="1"/>
+          <p:nvPr/>
+        </p:nvSpPr>
+        <p:spPr>
+          <a:xfrm>
+            <a:off x="467544" y="5172228"/>
+            <a:ext cx="1120820" cy="307777"/>
+          </a:xfrm>
+          <a:prstGeom prst="rect">
+            <a:avLst/>
+          </a:prstGeom>
+          <a:noFill/>
+          <a:ln>
+            <a:noFill/>
+          </a:ln>
+        </p:spPr>
+        <p:txBody>
+          <a:bodyPr wrap="none" rtlCol="0">
+            <a:spAutoFit/>
+          </a:bodyPr>
+          <a:lstStyle/>
+          <a:p>
+            <a:pPr algn="l">
+              <a:spcBef>
+                <a:spcPts val="0"/>
+              </a:spcBef>
+            </a:pPr>
+            <a:r>
+              <a:rPr lang="en-GB" sz="1400" b="0" dirty="0" smtClean="0"/>
+              <a:t>Cycle 2.vdri</a:t>
+            </a:r>
+          </a:p>
+        </p:txBody>
+      </p:sp>
+      <p:pic>
+        <p:nvPicPr>
+          <p:cNvPr id="1028" name="Picture 4"/>
+          <p:cNvPicPr>
+            <a:picLocks noChangeAspect="1" noChangeArrowheads="1"/>
+          </p:cNvPicPr>
+          <p:nvPr/>
+        </p:nvPicPr>
+        <p:blipFill>
+          <a:blip r:embed="rId5">
+            <a:extLst>
+              <a:ext uri="{28A0092B-C50C-407E-A947-70E740481C1C}">
+                <a14:useLocalDpi xmlns:a14="http://schemas.microsoft.com/office/drawing/2010/main" val="0"/>
+              </a:ext>
+            </a:extLst>
+          </a:blip>
+          <a:srcRect/>
+          <a:stretch>
+            <a:fillRect/>
+          </a:stretch>
+        </p:blipFill>
+        <p:spPr bwMode="auto">
+          <a:xfrm>
+            <a:off x="4665290" y="4820484"/>
+            <a:ext cx="3867150" cy="590550"/>
+          </a:xfrm>
+          <a:prstGeom prst="rect">
+            <a:avLst/>
+          </a:prstGeom>
+          <a:noFill/>
+          <a:ln>
+            <a:noFill/>
+          </a:ln>
+          <a:effectLst/>
+          <a:extLst>
+            <a:ext uri="{909E8E84-426E-40DD-AFC4-6F175D3DCCD1}">
+              <a14:hiddenFill xmlns:a14="http://schemas.microsoft.com/office/drawing/2010/main">
+                <a:solidFill>
+                  <a:schemeClr val="accent1"/>
+                </a:solidFill>
+              </a14:hiddenFill>
+            </a:ext>
+            <a:ext uri="{91240B29-F687-4F45-9708-019B960494DF}">
+              <a14:hiddenLine xmlns:a14="http://schemas.microsoft.com/office/drawing/2010/main" w="9525">
+                <a:solidFill>
+                  <a:schemeClr val="tx1"/>
+                </a:solidFill>
+                <a:miter lim="800000"/>
+                <a:headEnd/>
+                <a:tailEnd/>
+              </a14:hiddenLine>
+            </a:ext>
+            <a:ext uri="{AF507438-7753-43E0-B8FC-AC1667EBCBE1}">
+              <a14:hiddenEffects xmlns:a14="http://schemas.microsoft.com/office/drawing/2010/main">
+                <a:effectLst>
+                  <a:outerShdw dist="35921" dir="2700000" algn="ctr" rotWithShape="0">
+                    <a:schemeClr val="bg2"/>
+                  </a:outerShdw>
+                </a:effectLst>
+              </a14:hiddenEffects>
+            </a:ext>
+          </a:extLst>
+        </p:spPr>
+      </p:pic>
+      <p:sp>
+        <p:nvSpPr>
+          <p:cNvPr id="14" name="Pfeil nach unten 13"/>
+          <p:cNvSpPr/>
+          <p:nvPr/>
+        </p:nvSpPr>
+        <p:spPr bwMode="auto">
+          <a:xfrm rot="16200000">
+            <a:off x="3635896" y="4905164"/>
+            <a:ext cx="1080120" cy="504056"/>
+          </a:xfrm>
+          <a:prstGeom prst="downArrow">
+            <a:avLst/>
+          </a:prstGeom>
+          <a:solidFill>
+            <a:srgbClr val="990000"/>
+          </a:solidFill>
+          <a:ln w="19050" cap="flat" cmpd="sng" algn="ctr">
+            <a:solidFill>
+              <a:schemeClr val="tx1"/>
+            </a:solidFill>
+            <a:prstDash val="solid"/>
+            <a:round/>
+            <a:headEnd type="none" w="med" len="med"/>
+            <a:tailEnd type="triangle" w="med" len="med"/>
+          </a:ln>
+          <a:effectLst/>
+          <a:extLst/>
+        </p:spPr>
+        <p:txBody>
+          <a:bodyPr vert="horz" wrap="square" lIns="91440" tIns="45720" rIns="91440" bIns="45720" numCol="1" rtlCol="0" anchor="ctr" anchorCtr="0" compatLnSpc="1">
+            <a:prstTxWarp prst="textNoShape">
+              <a:avLst/>
+            </a:prstTxWarp>
+            <a:noAutofit/>
+          </a:bodyPr>
+          <a:lstStyle/>
+          <a:p>
+            <a:pPr marL="0" marR="0" indent="0" algn="ctr" defTabSz="914400" rtl="0" eaLnBrk="1" fontAlgn="base" latinLnBrk="0" hangingPunct="1">
+              <a:lnSpc>
+                <a:spcPct val="100000"/>
+              </a:lnSpc>
+              <a:spcBef>
+                <a:spcPct val="30000"/>
+              </a:spcBef>
+              <a:spcAft>
+                <a:spcPct val="0"/>
+              </a:spcAft>
+              <a:buClrTx/>
+              <a:buSzTx/>
+              <a:buFontTx/>
+              <a:buNone/>
+              <a:tabLst/>
+            </a:pPr>
+            <a:endParaRPr kumimoji="0" lang="en-GB" sz="2000" b="1" i="0" u="none" strike="noStrike" cap="none" normalizeH="0" baseline="0" smtClean="0">
+              <a:ln>
+                <a:noFill/>
+              </a:ln>
+              <a:solidFill>
+                <a:schemeClr val="tx1"/>
+              </a:solidFill>
+              <a:effectLst/>
+              <a:latin typeface="Arial" pitchFamily="34" charset="0"/>
+            </a:endParaRPr>
+          </a:p>
+        </p:txBody>
+      </p:sp>
+      <p:sp>
+        <p:nvSpPr>
+          <p:cNvPr id="15" name="Textfeld 14"/>
+          <p:cNvSpPr txBox="1"/>
+          <p:nvPr/>
+        </p:nvSpPr>
+        <p:spPr>
+          <a:xfrm>
+            <a:off x="4595187" y="4524618"/>
+            <a:ext cx="1239442" cy="307777"/>
+          </a:xfrm>
+          <a:prstGeom prst="rect">
+            <a:avLst/>
+          </a:prstGeom>
+          <a:noFill/>
+          <a:ln>
+            <a:noFill/>
+          </a:ln>
+        </p:spPr>
+        <p:txBody>
+          <a:bodyPr wrap="none" rtlCol="0">
+            <a:spAutoFit/>
+          </a:bodyPr>
+          <a:lstStyle/>
+          <a:p>
+            <a:pPr algn="l">
+              <a:spcBef>
+                <a:spcPts val="0"/>
+              </a:spcBef>
+            </a:pPr>
+            <a:r>
+              <a:rPr lang="en-GB" sz="1400" b="0" dirty="0" smtClean="0"/>
+              <a:t>.</a:t>
+            </a:r>
+            <a:r>
+              <a:rPr lang="en-GB" sz="1400" b="0" dirty="0" err="1" smtClean="0"/>
+              <a:t>vsum</a:t>
+            </a:r>
+            <a:r>
+              <a:rPr lang="en-GB" sz="1400" b="0" dirty="0" smtClean="0"/>
+              <a:t> results</a:t>
+            </a:r>
+            <a:endParaRPr lang="en-GB" sz="1400" b="0" dirty="0" smtClean="0"/>
+          </a:p>
+        </p:txBody>
+      </p:sp>
+    </p:spTree>
+    <p:extLst>
+      <p:ext uri="{BB962C8B-B14F-4D97-AF65-F5344CB8AC3E}">
+        <p14:creationId xmlns:p14="http://schemas.microsoft.com/office/powerpoint/2010/main" val="516969336"/>
+      </p:ext>
+    </p:extLst>
+  </p:cSld>
+  <p:clrMapOvr>
+    <a:masterClrMapping/>
+  </p:clrMapOvr>
+  <p:timing>
+    <p:tnLst>
+      <p:par>
+        <p:cTn id="1" dur="indefinite" restart="never" nodeType="tmRoot"/>
+      </p:par>
+    </p:tnLst>
+  </p:timing>
+</p:sld>
+</file>
+
+<file path=ppt/slides/slide8.xml><?xml version="1.0" encoding="utf-8"?>
 <p:sld xmlns:a="http://schemas.openxmlformats.org/drawingml/2006/main" xmlns:r="http://schemas.openxmlformats.org/officeDocument/2006/relationships" xmlns:p="http://schemas.openxmlformats.org/presentationml/2006/main">
   <p:cSld>
     <p:spTree>

</xml_diff>